<commit_message>
codeQuality: tweak examples to suit python
</commit_message>
<xml_diff>
--- a/diagrams/codeQuality/practices/avoidDeepNesting/arrowheadStyle.pptx
+++ b/diagrams/codeQuality/practices/avoidDeepNesting/arrowheadStyle.pptx
@@ -104,6 +104,22 @@
       </a:defRPr>
     </a:lvl9pPr>
   </p:defaultTextStyle>
+  <p:extLst>
+    <p:ext uri="{EFAFB233-063F-42B5-8137-9DF3F51BA10A}">
+      <p15:sldGuideLst xmlns:p15="http://schemas.microsoft.com/office/powerpoint/2012/main">
+        <p15:guide id="1" orient="horz" pos="2160">
+          <p15:clr>
+            <a:srgbClr val="A4A3A4"/>
+          </p15:clr>
+        </p15:guide>
+        <p15:guide id="2" pos="2880">
+          <p15:clr>
+            <a:srgbClr val="A4A3A4"/>
+          </p15:clr>
+        </p15:guide>
+      </p15:sldGuideLst>
+    </p:ext>
+  </p:extLst>
 </p:presentation>
 </file>
 
@@ -288,7 +304,7 @@
           <a:p>
             <a:fld id="{7B2EFB2C-C3AA-4B80-98CF-6AA605865716}" type="datetimeFigureOut">
               <a:rPr lang="en-SG" smtClean="0"/>
-              <a:t>15/6/2017</a:t>
+              <a:t>9/3/2019</a:t>
             </a:fld>
             <a:endParaRPr lang="en-SG"/>
           </a:p>
@@ -458,7 +474,7 @@
           <a:p>
             <a:fld id="{7B2EFB2C-C3AA-4B80-98CF-6AA605865716}" type="datetimeFigureOut">
               <a:rPr lang="en-SG" smtClean="0"/>
-              <a:t>15/6/2017</a:t>
+              <a:t>9/3/2019</a:t>
             </a:fld>
             <a:endParaRPr lang="en-SG"/>
           </a:p>
@@ -638,7 +654,7 @@
           <a:p>
             <a:fld id="{7B2EFB2C-C3AA-4B80-98CF-6AA605865716}" type="datetimeFigureOut">
               <a:rPr lang="en-SG" smtClean="0"/>
-              <a:t>15/6/2017</a:t>
+              <a:t>9/3/2019</a:t>
             </a:fld>
             <a:endParaRPr lang="en-SG"/>
           </a:p>
@@ -808,7 +824,7 @@
           <a:p>
             <a:fld id="{7B2EFB2C-C3AA-4B80-98CF-6AA605865716}" type="datetimeFigureOut">
               <a:rPr lang="en-SG" smtClean="0"/>
-              <a:t>15/6/2017</a:t>
+              <a:t>9/3/2019</a:t>
             </a:fld>
             <a:endParaRPr lang="en-SG"/>
           </a:p>
@@ -1054,7 +1070,7 @@
           <a:p>
             <a:fld id="{7B2EFB2C-C3AA-4B80-98CF-6AA605865716}" type="datetimeFigureOut">
               <a:rPr lang="en-SG" smtClean="0"/>
-              <a:t>15/6/2017</a:t>
+              <a:t>9/3/2019</a:t>
             </a:fld>
             <a:endParaRPr lang="en-SG"/>
           </a:p>
@@ -1342,7 +1358,7 @@
           <a:p>
             <a:fld id="{7B2EFB2C-C3AA-4B80-98CF-6AA605865716}" type="datetimeFigureOut">
               <a:rPr lang="en-SG" smtClean="0"/>
-              <a:t>15/6/2017</a:t>
+              <a:t>9/3/2019</a:t>
             </a:fld>
             <a:endParaRPr lang="en-SG"/>
           </a:p>
@@ -1764,7 +1780,7 @@
           <a:p>
             <a:fld id="{7B2EFB2C-C3AA-4B80-98CF-6AA605865716}" type="datetimeFigureOut">
               <a:rPr lang="en-SG" smtClean="0"/>
-              <a:t>15/6/2017</a:t>
+              <a:t>9/3/2019</a:t>
             </a:fld>
             <a:endParaRPr lang="en-SG"/>
           </a:p>
@@ -1882,7 +1898,7 @@
           <a:p>
             <a:fld id="{7B2EFB2C-C3AA-4B80-98CF-6AA605865716}" type="datetimeFigureOut">
               <a:rPr lang="en-SG" smtClean="0"/>
-              <a:t>15/6/2017</a:t>
+              <a:t>9/3/2019</a:t>
             </a:fld>
             <a:endParaRPr lang="en-SG"/>
           </a:p>
@@ -1977,7 +1993,7 @@
           <a:p>
             <a:fld id="{7B2EFB2C-C3AA-4B80-98CF-6AA605865716}" type="datetimeFigureOut">
               <a:rPr lang="en-SG" smtClean="0"/>
-              <a:t>15/6/2017</a:t>
+              <a:t>9/3/2019</a:t>
             </a:fld>
             <a:endParaRPr lang="en-SG"/>
           </a:p>
@@ -2254,7 +2270,7 @@
           <a:p>
             <a:fld id="{7B2EFB2C-C3AA-4B80-98CF-6AA605865716}" type="datetimeFigureOut">
               <a:rPr lang="en-SG" smtClean="0"/>
-              <a:t>15/6/2017</a:t>
+              <a:t>9/3/2019</a:t>
             </a:fld>
             <a:endParaRPr lang="en-SG"/>
           </a:p>
@@ -2507,7 +2523,7 @@
           <a:p>
             <a:fld id="{7B2EFB2C-C3AA-4B80-98CF-6AA605865716}" type="datetimeFigureOut">
               <a:rPr lang="en-SG" smtClean="0"/>
-              <a:t>15/6/2017</a:t>
+              <a:t>9/3/2019</a:t>
             </a:fld>
             <a:endParaRPr lang="en-SG"/>
           </a:p>
@@ -2720,7 +2736,7 @@
           <a:p>
             <a:fld id="{7B2EFB2C-C3AA-4B80-98CF-6AA605865716}" type="datetimeFigureOut">
               <a:rPr lang="en-SG" smtClean="0"/>
-              <a:t>15/6/2017</a:t>
+              <a:t>9/3/2019</a:t>
             </a:fld>
             <a:endParaRPr lang="en-SG"/>
           </a:p>
@@ -3669,8 +3685,138 @@
             </a:pathLst>
           </a:custGeom>
           <a:solidFill>
+            <a:schemeClr val="accent2">
+              <a:lumMod val="20000"/>
+              <a:lumOff val="80000"/>
+            </a:schemeClr>
+          </a:solidFill>
+          <a:ln>
+            <a:solidFill>
+              <a:schemeClr val="accent2">
+                <a:lumMod val="60000"/>
+                <a:lumOff val="40000"/>
+              </a:schemeClr>
+            </a:solidFill>
+          </a:ln>
+        </p:spPr>
+        <p:style>
+          <a:lnRef idx="2">
+            <a:schemeClr val="accent1">
+              <a:shade val="50000"/>
+            </a:schemeClr>
+          </a:lnRef>
+          <a:fillRef idx="1">
+            <a:schemeClr val="accent1"/>
+          </a:fillRef>
+          <a:effectRef idx="0">
+            <a:schemeClr val="accent1"/>
+          </a:effectRef>
+          <a:fontRef idx="minor">
+            <a:schemeClr val="lt1"/>
+          </a:fontRef>
+        </p:style>
+        <p:txBody>
+          <a:bodyPr rtlCol="0" anchor="ctr"/>
+          <a:lstStyle/>
+          <a:p>
+            <a:pPr algn="r"/>
+            <a:endParaRPr lang="en-US" dirty="0"/>
+          </a:p>
+        </p:txBody>
+      </p:sp>
+      <p:sp>
+        <p:nvSpPr>
+          <p:cNvPr id="8" name="TextBox 7"/>
+          <p:cNvSpPr txBox="1"/>
+          <p:nvPr/>
+        </p:nvSpPr>
+        <p:spPr>
+          <a:xfrm>
+            <a:off x="1828800" y="1820017"/>
+            <a:ext cx="914400" cy="646331"/>
+          </a:xfrm>
+          <a:prstGeom prst="rect">
+            <a:avLst/>
+          </a:prstGeom>
+          <a:noFill/>
+        </p:spPr>
+        <p:txBody>
+          <a:bodyPr wrap="square" rtlCol="0">
+            <a:spAutoFit/>
+          </a:bodyPr>
+          <a:lstStyle/>
+          <a:p>
+            <a:r>
+              <a:rPr lang="en-US" b="1" dirty="0" smtClean="0">
+                <a:solidFill>
+                  <a:srgbClr val="C00000"/>
+                </a:solidFill>
+              </a:rPr>
+              <a:t>Arrow Head!</a:t>
+            </a:r>
+            <a:endParaRPr lang="en-US" b="1" dirty="0">
+              <a:solidFill>
+                <a:srgbClr val="C00000"/>
+              </a:solidFill>
+            </a:endParaRPr>
+          </a:p>
+        </p:txBody>
+      </p:sp>
+      <p:sp>
+        <p:nvSpPr>
+          <p:cNvPr id="9" name="TextBox 8"/>
+          <p:cNvSpPr txBox="1"/>
+          <p:nvPr/>
+        </p:nvSpPr>
+        <p:spPr>
+          <a:xfrm>
+            <a:off x="6002813" y="4322534"/>
+            <a:ext cx="2133600" cy="369332"/>
+          </a:xfrm>
+          <a:prstGeom prst="rect">
+            <a:avLst/>
+          </a:prstGeom>
+          <a:noFill/>
+        </p:spPr>
+        <p:txBody>
+          <a:bodyPr wrap="square" rtlCol="0">
+            <a:spAutoFit/>
+          </a:bodyPr>
+          <a:lstStyle/>
+          <a:p>
+            <a:r>
+              <a:rPr lang="en-US" b="1" dirty="0" smtClean="0">
+                <a:solidFill>
+                  <a:srgbClr val="00B050"/>
+                </a:solidFill>
+              </a:rPr>
+              <a:t>No arrowhead here!</a:t>
+            </a:r>
+            <a:endParaRPr lang="en-US" b="1" dirty="0">
+              <a:solidFill>
+                <a:srgbClr val="00B050"/>
+              </a:solidFill>
+            </a:endParaRPr>
+          </a:p>
+        </p:txBody>
+      </p:sp>
+      <p:sp>
+        <p:nvSpPr>
+          <p:cNvPr id="2" name="Rectangle 1"/>
+          <p:cNvSpPr/>
+          <p:nvPr/>
+        </p:nvSpPr>
+        <p:spPr>
+          <a:xfrm>
+            <a:off x="1619672" y="692696"/>
+            <a:ext cx="1080120" cy="216024"/>
+          </a:xfrm>
+          <a:prstGeom prst="rect">
+            <a:avLst/>
+          </a:prstGeom>
+          <a:solidFill>
             <a:schemeClr val="bg1">
-              <a:lumMod val="95000"/>
+              <a:lumMod val="75000"/>
             </a:schemeClr>
           </a:solidFill>
           <a:ln>
@@ -3701,91 +3847,1725 @@
           <a:bodyPr rtlCol="0" anchor="ctr"/>
           <a:lstStyle/>
           <a:p>
-            <a:pPr algn="r"/>
-            <a:endParaRPr lang="en-US" dirty="0"/>
-          </a:p>
-        </p:txBody>
-      </p:sp>
-      <p:sp>
-        <p:nvSpPr>
-          <p:cNvPr id="8" name="TextBox 7"/>
-          <p:cNvSpPr txBox="1"/>
+            <a:r>
+              <a:rPr lang="en-US" dirty="0" smtClean="0">
+                <a:latin typeface="Consolas" panose="020B0609020204030204" pitchFamily="49" charset="0"/>
+              </a:rPr>
+              <a:t>code</a:t>
+            </a:r>
+            <a:endParaRPr lang="en-US" dirty="0">
+              <a:latin typeface="Consolas" panose="020B0609020204030204" pitchFamily="49" charset="0"/>
+            </a:endParaRPr>
+          </a:p>
+        </p:txBody>
+      </p:sp>
+      <p:sp>
+        <p:nvSpPr>
+          <p:cNvPr id="10" name="Rectangle 9"/>
+          <p:cNvSpPr/>
           <p:nvPr/>
         </p:nvSpPr>
         <p:spPr>
           <a:xfrm>
-            <a:off x="1828800" y="1820017"/>
-            <a:ext cx="914400" cy="646331"/>
+            <a:off x="2051720" y="968262"/>
+            <a:ext cx="1080120" cy="216024"/>
           </a:xfrm>
           <a:prstGeom prst="rect">
             <a:avLst/>
           </a:prstGeom>
-          <a:noFill/>
+          <a:solidFill>
+            <a:schemeClr val="bg1">
+              <a:lumMod val="75000"/>
+            </a:schemeClr>
+          </a:solidFill>
+          <a:ln>
+            <a:solidFill>
+              <a:schemeClr val="bg1">
+                <a:lumMod val="75000"/>
+              </a:schemeClr>
+            </a:solidFill>
+          </a:ln>
         </p:spPr>
-        <p:txBody>
-          <a:bodyPr wrap="square" rtlCol="0">
-            <a:spAutoFit/>
-          </a:bodyPr>
-          <a:lstStyle/>
-          <a:p>
-            <a:r>
-              <a:rPr lang="en-US" b="1" dirty="0" smtClean="0">
-                <a:solidFill>
-                  <a:schemeClr val="bg1">
-                    <a:lumMod val="75000"/>
-                  </a:schemeClr>
-                </a:solidFill>
+        <p:style>
+          <a:lnRef idx="2">
+            <a:schemeClr val="accent1">
+              <a:shade val="50000"/>
+            </a:schemeClr>
+          </a:lnRef>
+          <a:fillRef idx="1">
+            <a:schemeClr val="accent1"/>
+          </a:fillRef>
+          <a:effectRef idx="0">
+            <a:schemeClr val="accent1"/>
+          </a:effectRef>
+          <a:fontRef idx="minor">
+            <a:schemeClr val="lt1"/>
+          </a:fontRef>
+        </p:style>
+        <p:txBody>
+          <a:bodyPr rtlCol="0" anchor="ctr"/>
+          <a:lstStyle/>
+          <a:p>
+            <a:r>
+              <a:rPr lang="en-US" dirty="0" smtClean="0">
+                <a:latin typeface="Consolas" panose="020B0609020204030204" pitchFamily="49" charset="0"/>
               </a:rPr>
-              <a:t>Arrow Head!</a:t>
-            </a:r>
-            <a:endParaRPr lang="en-US" b="1" dirty="0">
-              <a:solidFill>
-                <a:schemeClr val="bg1">
-                  <a:lumMod val="75000"/>
-                </a:schemeClr>
-              </a:solidFill>
+              <a:t>code</a:t>
+            </a:r>
+            <a:endParaRPr lang="en-US" dirty="0">
+              <a:latin typeface="Consolas" panose="020B0609020204030204" pitchFamily="49" charset="0"/>
             </a:endParaRPr>
           </a:p>
         </p:txBody>
       </p:sp>
       <p:sp>
         <p:nvSpPr>
-          <p:cNvPr id="9" name="TextBox 8"/>
-          <p:cNvSpPr txBox="1"/>
+          <p:cNvPr id="11" name="Rectangle 10"/>
+          <p:cNvSpPr/>
           <p:nvPr/>
         </p:nvSpPr>
         <p:spPr>
           <a:xfrm>
-            <a:off x="6019800" y="4495800"/>
-            <a:ext cx="2133600" cy="369332"/>
+            <a:off x="2483768" y="1243828"/>
+            <a:ext cx="1080120" cy="216024"/>
           </a:xfrm>
           <a:prstGeom prst="rect">
             <a:avLst/>
           </a:prstGeom>
-          <a:noFill/>
+          <a:solidFill>
+            <a:schemeClr val="bg1">
+              <a:lumMod val="75000"/>
+            </a:schemeClr>
+          </a:solidFill>
+          <a:ln>
+            <a:solidFill>
+              <a:schemeClr val="bg1">
+                <a:lumMod val="75000"/>
+              </a:schemeClr>
+            </a:solidFill>
+          </a:ln>
         </p:spPr>
-        <p:txBody>
-          <a:bodyPr wrap="square" rtlCol="0">
-            <a:spAutoFit/>
-          </a:bodyPr>
-          <a:lstStyle/>
-          <a:p>
-            <a:r>
-              <a:rPr lang="en-US" b="1" dirty="0" smtClean="0">
-                <a:solidFill>
-                  <a:schemeClr val="bg1">
-                    <a:lumMod val="75000"/>
-                  </a:schemeClr>
-                </a:solidFill>
+        <p:style>
+          <a:lnRef idx="2">
+            <a:schemeClr val="accent1">
+              <a:shade val="50000"/>
+            </a:schemeClr>
+          </a:lnRef>
+          <a:fillRef idx="1">
+            <a:schemeClr val="accent1"/>
+          </a:fillRef>
+          <a:effectRef idx="0">
+            <a:schemeClr val="accent1"/>
+          </a:effectRef>
+          <a:fontRef idx="minor">
+            <a:schemeClr val="lt1"/>
+          </a:fontRef>
+        </p:style>
+        <p:txBody>
+          <a:bodyPr rtlCol="0" anchor="ctr"/>
+          <a:lstStyle/>
+          <a:p>
+            <a:r>
+              <a:rPr lang="en-US" dirty="0" smtClean="0">
+                <a:latin typeface="Consolas" panose="020B0609020204030204" pitchFamily="49" charset="0"/>
               </a:rPr>
-              <a:t>Better!</a:t>
-            </a:r>
-            <a:endParaRPr lang="en-US" b="1" dirty="0">
-              <a:solidFill>
-                <a:schemeClr val="bg1">
-                  <a:lumMod val="75000"/>
-                </a:schemeClr>
-              </a:solidFill>
+              <a:t>code</a:t>
+            </a:r>
+            <a:endParaRPr lang="en-US" dirty="0">
+              <a:latin typeface="Consolas" panose="020B0609020204030204" pitchFamily="49" charset="0"/>
+            </a:endParaRPr>
+          </a:p>
+        </p:txBody>
+      </p:sp>
+      <p:sp>
+        <p:nvSpPr>
+          <p:cNvPr id="12" name="Rectangle 11"/>
+          <p:cNvSpPr/>
+          <p:nvPr/>
+        </p:nvSpPr>
+        <p:spPr>
+          <a:xfrm>
+            <a:off x="2915816" y="1519394"/>
+            <a:ext cx="1152128" cy="216024"/>
+          </a:xfrm>
+          <a:prstGeom prst="rect">
+            <a:avLst/>
+          </a:prstGeom>
+          <a:solidFill>
+            <a:schemeClr val="bg1">
+              <a:lumMod val="75000"/>
+            </a:schemeClr>
+          </a:solidFill>
+          <a:ln>
+            <a:solidFill>
+              <a:schemeClr val="bg1">
+                <a:lumMod val="75000"/>
+              </a:schemeClr>
+            </a:solidFill>
+          </a:ln>
+        </p:spPr>
+        <p:style>
+          <a:lnRef idx="2">
+            <a:schemeClr val="accent1">
+              <a:shade val="50000"/>
+            </a:schemeClr>
+          </a:lnRef>
+          <a:fillRef idx="1">
+            <a:schemeClr val="accent1"/>
+          </a:fillRef>
+          <a:effectRef idx="0">
+            <a:schemeClr val="accent1"/>
+          </a:effectRef>
+          <a:fontRef idx="minor">
+            <a:schemeClr val="lt1"/>
+          </a:fontRef>
+        </p:style>
+        <p:txBody>
+          <a:bodyPr rtlCol="0" anchor="ctr"/>
+          <a:lstStyle/>
+          <a:p>
+            <a:r>
+              <a:rPr lang="en-US" dirty="0" smtClean="0">
+                <a:latin typeface="Consolas" panose="020B0609020204030204" pitchFamily="49" charset="0"/>
+              </a:rPr>
+              <a:t>code</a:t>
+            </a:r>
+            <a:endParaRPr lang="en-US" dirty="0">
+              <a:latin typeface="Consolas" panose="020B0609020204030204" pitchFamily="49" charset="0"/>
+            </a:endParaRPr>
+          </a:p>
+        </p:txBody>
+      </p:sp>
+      <p:sp>
+        <p:nvSpPr>
+          <p:cNvPr id="13" name="Rectangle 12"/>
+          <p:cNvSpPr/>
+          <p:nvPr/>
+        </p:nvSpPr>
+        <p:spPr>
+          <a:xfrm>
+            <a:off x="3347864" y="1794960"/>
+            <a:ext cx="1080120" cy="216024"/>
+          </a:xfrm>
+          <a:prstGeom prst="rect">
+            <a:avLst/>
+          </a:prstGeom>
+          <a:solidFill>
+            <a:schemeClr val="bg1">
+              <a:lumMod val="75000"/>
+            </a:schemeClr>
+          </a:solidFill>
+          <a:ln>
+            <a:solidFill>
+              <a:schemeClr val="bg1">
+                <a:lumMod val="75000"/>
+              </a:schemeClr>
+            </a:solidFill>
+          </a:ln>
+        </p:spPr>
+        <p:style>
+          <a:lnRef idx="2">
+            <a:schemeClr val="accent1">
+              <a:shade val="50000"/>
+            </a:schemeClr>
+          </a:lnRef>
+          <a:fillRef idx="1">
+            <a:schemeClr val="accent1"/>
+          </a:fillRef>
+          <a:effectRef idx="0">
+            <a:schemeClr val="accent1"/>
+          </a:effectRef>
+          <a:fontRef idx="minor">
+            <a:schemeClr val="lt1"/>
+          </a:fontRef>
+        </p:style>
+        <p:txBody>
+          <a:bodyPr rtlCol="0" anchor="ctr"/>
+          <a:lstStyle/>
+          <a:p>
+            <a:r>
+              <a:rPr lang="en-US" dirty="0" smtClean="0">
+                <a:latin typeface="Consolas" panose="020B0609020204030204" pitchFamily="49" charset="0"/>
+              </a:rPr>
+              <a:t>code</a:t>
+            </a:r>
+            <a:endParaRPr lang="en-US" dirty="0">
+              <a:latin typeface="Consolas" panose="020B0609020204030204" pitchFamily="49" charset="0"/>
+            </a:endParaRPr>
+          </a:p>
+        </p:txBody>
+      </p:sp>
+      <p:sp>
+        <p:nvSpPr>
+          <p:cNvPr id="14" name="Rectangle 13"/>
+          <p:cNvSpPr/>
+          <p:nvPr/>
+        </p:nvSpPr>
+        <p:spPr>
+          <a:xfrm>
+            <a:off x="3347864" y="2070526"/>
+            <a:ext cx="1080120" cy="216024"/>
+          </a:xfrm>
+          <a:prstGeom prst="rect">
+            <a:avLst/>
+          </a:prstGeom>
+          <a:solidFill>
+            <a:schemeClr val="bg1">
+              <a:lumMod val="75000"/>
+            </a:schemeClr>
+          </a:solidFill>
+          <a:ln>
+            <a:solidFill>
+              <a:schemeClr val="bg1">
+                <a:lumMod val="75000"/>
+              </a:schemeClr>
+            </a:solidFill>
+          </a:ln>
+        </p:spPr>
+        <p:style>
+          <a:lnRef idx="2">
+            <a:schemeClr val="accent1">
+              <a:shade val="50000"/>
+            </a:schemeClr>
+          </a:lnRef>
+          <a:fillRef idx="1">
+            <a:schemeClr val="accent1"/>
+          </a:fillRef>
+          <a:effectRef idx="0">
+            <a:schemeClr val="accent1"/>
+          </a:effectRef>
+          <a:fontRef idx="minor">
+            <a:schemeClr val="lt1"/>
+          </a:fontRef>
+        </p:style>
+        <p:txBody>
+          <a:bodyPr rtlCol="0" anchor="ctr"/>
+          <a:lstStyle/>
+          <a:p>
+            <a:r>
+              <a:rPr lang="en-US" dirty="0" smtClean="0">
+                <a:latin typeface="Consolas" panose="020B0609020204030204" pitchFamily="49" charset="0"/>
+              </a:rPr>
+              <a:t>code</a:t>
+            </a:r>
+            <a:endParaRPr lang="en-US" dirty="0">
+              <a:latin typeface="Consolas" panose="020B0609020204030204" pitchFamily="49" charset="0"/>
+            </a:endParaRPr>
+          </a:p>
+        </p:txBody>
+      </p:sp>
+      <p:sp>
+        <p:nvSpPr>
+          <p:cNvPr id="15" name="Rectangle 14"/>
+          <p:cNvSpPr/>
+          <p:nvPr/>
+        </p:nvSpPr>
+        <p:spPr>
+          <a:xfrm>
+            <a:off x="2987824" y="2346092"/>
+            <a:ext cx="735310" cy="216024"/>
+          </a:xfrm>
+          <a:prstGeom prst="rect">
+            <a:avLst/>
+          </a:prstGeom>
+          <a:solidFill>
+            <a:schemeClr val="bg1">
+              <a:lumMod val="75000"/>
+            </a:schemeClr>
+          </a:solidFill>
+          <a:ln>
+            <a:solidFill>
+              <a:schemeClr val="bg1">
+                <a:lumMod val="75000"/>
+              </a:schemeClr>
+            </a:solidFill>
+          </a:ln>
+        </p:spPr>
+        <p:style>
+          <a:lnRef idx="2">
+            <a:schemeClr val="accent1">
+              <a:shade val="50000"/>
+            </a:schemeClr>
+          </a:lnRef>
+          <a:fillRef idx="1">
+            <a:schemeClr val="accent1"/>
+          </a:fillRef>
+          <a:effectRef idx="0">
+            <a:schemeClr val="accent1"/>
+          </a:effectRef>
+          <a:fontRef idx="minor">
+            <a:schemeClr val="lt1"/>
+          </a:fontRef>
+        </p:style>
+        <p:txBody>
+          <a:bodyPr rtlCol="0" anchor="ctr"/>
+          <a:lstStyle/>
+          <a:p>
+            <a:r>
+              <a:rPr lang="en-US" dirty="0" smtClean="0">
+                <a:latin typeface="Consolas" panose="020B0609020204030204" pitchFamily="49" charset="0"/>
+              </a:rPr>
+              <a:t>code</a:t>
+            </a:r>
+            <a:endParaRPr lang="en-US" dirty="0">
+              <a:latin typeface="Consolas" panose="020B0609020204030204" pitchFamily="49" charset="0"/>
+            </a:endParaRPr>
+          </a:p>
+        </p:txBody>
+      </p:sp>
+      <p:sp>
+        <p:nvSpPr>
+          <p:cNvPr id="16" name="Rectangle 15"/>
+          <p:cNvSpPr/>
+          <p:nvPr/>
+        </p:nvSpPr>
+        <p:spPr>
+          <a:xfrm>
+            <a:off x="3347864" y="2621658"/>
+            <a:ext cx="1728192" cy="216024"/>
+          </a:xfrm>
+          <a:prstGeom prst="rect">
+            <a:avLst/>
+          </a:prstGeom>
+          <a:solidFill>
+            <a:schemeClr val="bg1">
+              <a:lumMod val="75000"/>
+            </a:schemeClr>
+          </a:solidFill>
+          <a:ln>
+            <a:solidFill>
+              <a:schemeClr val="bg1">
+                <a:lumMod val="75000"/>
+              </a:schemeClr>
+            </a:solidFill>
+          </a:ln>
+        </p:spPr>
+        <p:style>
+          <a:lnRef idx="2">
+            <a:schemeClr val="accent1">
+              <a:shade val="50000"/>
+            </a:schemeClr>
+          </a:lnRef>
+          <a:fillRef idx="1">
+            <a:schemeClr val="accent1"/>
+          </a:fillRef>
+          <a:effectRef idx="0">
+            <a:schemeClr val="accent1"/>
+          </a:effectRef>
+          <a:fontRef idx="minor">
+            <a:schemeClr val="lt1"/>
+          </a:fontRef>
+        </p:style>
+        <p:txBody>
+          <a:bodyPr rtlCol="0" anchor="ctr"/>
+          <a:lstStyle/>
+          <a:p>
+            <a:r>
+              <a:rPr lang="en-US" dirty="0" smtClean="0">
+                <a:latin typeface="Consolas" panose="020B0609020204030204" pitchFamily="49" charset="0"/>
+              </a:rPr>
+              <a:t>code</a:t>
+            </a:r>
+            <a:endParaRPr lang="en-US" dirty="0">
+              <a:latin typeface="Consolas" panose="020B0609020204030204" pitchFamily="49" charset="0"/>
+            </a:endParaRPr>
+          </a:p>
+        </p:txBody>
+      </p:sp>
+      <p:sp>
+        <p:nvSpPr>
+          <p:cNvPr id="17" name="Rectangle 16"/>
+          <p:cNvSpPr/>
+          <p:nvPr/>
+        </p:nvSpPr>
+        <p:spPr>
+          <a:xfrm>
+            <a:off x="2987824" y="2897224"/>
+            <a:ext cx="1080120" cy="216024"/>
+          </a:xfrm>
+          <a:prstGeom prst="rect">
+            <a:avLst/>
+          </a:prstGeom>
+          <a:solidFill>
+            <a:schemeClr val="bg1">
+              <a:lumMod val="75000"/>
+            </a:schemeClr>
+          </a:solidFill>
+          <a:ln>
+            <a:solidFill>
+              <a:schemeClr val="bg1">
+                <a:lumMod val="75000"/>
+              </a:schemeClr>
+            </a:solidFill>
+          </a:ln>
+        </p:spPr>
+        <p:style>
+          <a:lnRef idx="2">
+            <a:schemeClr val="accent1">
+              <a:shade val="50000"/>
+            </a:schemeClr>
+          </a:lnRef>
+          <a:fillRef idx="1">
+            <a:schemeClr val="accent1"/>
+          </a:fillRef>
+          <a:effectRef idx="0">
+            <a:schemeClr val="accent1"/>
+          </a:effectRef>
+          <a:fontRef idx="minor">
+            <a:schemeClr val="lt1"/>
+          </a:fontRef>
+        </p:style>
+        <p:txBody>
+          <a:bodyPr rtlCol="0" anchor="ctr"/>
+          <a:lstStyle/>
+          <a:p>
+            <a:r>
+              <a:rPr lang="en-US" dirty="0" smtClean="0">
+                <a:latin typeface="Consolas" panose="020B0609020204030204" pitchFamily="49" charset="0"/>
+              </a:rPr>
+              <a:t>code</a:t>
+            </a:r>
+            <a:endParaRPr lang="en-US" dirty="0">
+              <a:latin typeface="Consolas" panose="020B0609020204030204" pitchFamily="49" charset="0"/>
+            </a:endParaRPr>
+          </a:p>
+        </p:txBody>
+      </p:sp>
+      <p:sp>
+        <p:nvSpPr>
+          <p:cNvPr id="18" name="Rectangle 17"/>
+          <p:cNvSpPr/>
+          <p:nvPr/>
+        </p:nvSpPr>
+        <p:spPr>
+          <a:xfrm>
+            <a:off x="2555776" y="3172790"/>
+            <a:ext cx="792088" cy="216024"/>
+          </a:xfrm>
+          <a:prstGeom prst="rect">
+            <a:avLst/>
+          </a:prstGeom>
+          <a:solidFill>
+            <a:schemeClr val="bg1">
+              <a:lumMod val="75000"/>
+            </a:schemeClr>
+          </a:solidFill>
+          <a:ln>
+            <a:solidFill>
+              <a:schemeClr val="bg1">
+                <a:lumMod val="75000"/>
+              </a:schemeClr>
+            </a:solidFill>
+          </a:ln>
+        </p:spPr>
+        <p:style>
+          <a:lnRef idx="2">
+            <a:schemeClr val="accent1">
+              <a:shade val="50000"/>
+            </a:schemeClr>
+          </a:lnRef>
+          <a:fillRef idx="1">
+            <a:schemeClr val="accent1"/>
+          </a:fillRef>
+          <a:effectRef idx="0">
+            <a:schemeClr val="accent1"/>
+          </a:effectRef>
+          <a:fontRef idx="minor">
+            <a:schemeClr val="lt1"/>
+          </a:fontRef>
+        </p:style>
+        <p:txBody>
+          <a:bodyPr rtlCol="0" anchor="ctr"/>
+          <a:lstStyle/>
+          <a:p>
+            <a:r>
+              <a:rPr lang="en-US" dirty="0" smtClean="0">
+                <a:latin typeface="Consolas" panose="020B0609020204030204" pitchFamily="49" charset="0"/>
+              </a:rPr>
+              <a:t>code</a:t>
+            </a:r>
+            <a:endParaRPr lang="en-US" dirty="0">
+              <a:latin typeface="Consolas" panose="020B0609020204030204" pitchFamily="49" charset="0"/>
+            </a:endParaRPr>
+          </a:p>
+        </p:txBody>
+      </p:sp>
+      <p:sp>
+        <p:nvSpPr>
+          <p:cNvPr id="19" name="Rectangle 18"/>
+          <p:cNvSpPr/>
+          <p:nvPr/>
+        </p:nvSpPr>
+        <p:spPr>
+          <a:xfrm>
+            <a:off x="2987824" y="3448356"/>
+            <a:ext cx="1728192" cy="216024"/>
+          </a:xfrm>
+          <a:prstGeom prst="rect">
+            <a:avLst/>
+          </a:prstGeom>
+          <a:solidFill>
+            <a:schemeClr val="bg1">
+              <a:lumMod val="75000"/>
+            </a:schemeClr>
+          </a:solidFill>
+          <a:ln>
+            <a:solidFill>
+              <a:schemeClr val="bg1">
+                <a:lumMod val="75000"/>
+              </a:schemeClr>
+            </a:solidFill>
+          </a:ln>
+        </p:spPr>
+        <p:style>
+          <a:lnRef idx="2">
+            <a:schemeClr val="accent1">
+              <a:shade val="50000"/>
+            </a:schemeClr>
+          </a:lnRef>
+          <a:fillRef idx="1">
+            <a:schemeClr val="accent1"/>
+          </a:fillRef>
+          <a:effectRef idx="0">
+            <a:schemeClr val="accent1"/>
+          </a:effectRef>
+          <a:fontRef idx="minor">
+            <a:schemeClr val="lt1"/>
+          </a:fontRef>
+        </p:style>
+        <p:txBody>
+          <a:bodyPr rtlCol="0" anchor="ctr"/>
+          <a:lstStyle/>
+          <a:p>
+            <a:r>
+              <a:rPr lang="en-US" dirty="0" smtClean="0">
+                <a:latin typeface="Consolas" panose="020B0609020204030204" pitchFamily="49" charset="0"/>
+              </a:rPr>
+              <a:t>code</a:t>
+            </a:r>
+            <a:endParaRPr lang="en-US" dirty="0">
+              <a:latin typeface="Consolas" panose="020B0609020204030204" pitchFamily="49" charset="0"/>
+            </a:endParaRPr>
+          </a:p>
+        </p:txBody>
+      </p:sp>
+      <p:sp>
+        <p:nvSpPr>
+          <p:cNvPr id="20" name="Rectangle 19"/>
+          <p:cNvSpPr/>
+          <p:nvPr/>
+        </p:nvSpPr>
+        <p:spPr>
+          <a:xfrm>
+            <a:off x="2483768" y="3723922"/>
+            <a:ext cx="1080120" cy="216024"/>
+          </a:xfrm>
+          <a:prstGeom prst="rect">
+            <a:avLst/>
+          </a:prstGeom>
+          <a:solidFill>
+            <a:schemeClr val="bg1">
+              <a:lumMod val="75000"/>
+            </a:schemeClr>
+          </a:solidFill>
+          <a:ln>
+            <a:solidFill>
+              <a:schemeClr val="bg1">
+                <a:lumMod val="75000"/>
+              </a:schemeClr>
+            </a:solidFill>
+          </a:ln>
+        </p:spPr>
+        <p:style>
+          <a:lnRef idx="2">
+            <a:schemeClr val="accent1">
+              <a:shade val="50000"/>
+            </a:schemeClr>
+          </a:lnRef>
+          <a:fillRef idx="1">
+            <a:schemeClr val="accent1"/>
+          </a:fillRef>
+          <a:effectRef idx="0">
+            <a:schemeClr val="accent1"/>
+          </a:effectRef>
+          <a:fontRef idx="minor">
+            <a:schemeClr val="lt1"/>
+          </a:fontRef>
+        </p:style>
+        <p:txBody>
+          <a:bodyPr rtlCol="0" anchor="ctr"/>
+          <a:lstStyle/>
+          <a:p>
+            <a:r>
+              <a:rPr lang="en-US" dirty="0" smtClean="0">
+                <a:latin typeface="Consolas" panose="020B0609020204030204" pitchFamily="49" charset="0"/>
+              </a:rPr>
+              <a:t>code</a:t>
+            </a:r>
+            <a:endParaRPr lang="en-US" dirty="0">
+              <a:latin typeface="Consolas" panose="020B0609020204030204" pitchFamily="49" charset="0"/>
+            </a:endParaRPr>
+          </a:p>
+        </p:txBody>
+      </p:sp>
+      <p:sp>
+        <p:nvSpPr>
+          <p:cNvPr id="21" name="Rectangle 20"/>
+          <p:cNvSpPr/>
+          <p:nvPr/>
+        </p:nvSpPr>
+        <p:spPr>
+          <a:xfrm>
+            <a:off x="2084672" y="3999488"/>
+            <a:ext cx="831144" cy="216024"/>
+          </a:xfrm>
+          <a:prstGeom prst="rect">
+            <a:avLst/>
+          </a:prstGeom>
+          <a:solidFill>
+            <a:schemeClr val="bg1">
+              <a:lumMod val="75000"/>
+            </a:schemeClr>
+          </a:solidFill>
+          <a:ln>
+            <a:solidFill>
+              <a:schemeClr val="bg1">
+                <a:lumMod val="75000"/>
+              </a:schemeClr>
+            </a:solidFill>
+          </a:ln>
+        </p:spPr>
+        <p:style>
+          <a:lnRef idx="2">
+            <a:schemeClr val="accent1">
+              <a:shade val="50000"/>
+            </a:schemeClr>
+          </a:lnRef>
+          <a:fillRef idx="1">
+            <a:schemeClr val="accent1"/>
+          </a:fillRef>
+          <a:effectRef idx="0">
+            <a:schemeClr val="accent1"/>
+          </a:effectRef>
+          <a:fontRef idx="minor">
+            <a:schemeClr val="lt1"/>
+          </a:fontRef>
+        </p:style>
+        <p:txBody>
+          <a:bodyPr rtlCol="0" anchor="ctr"/>
+          <a:lstStyle/>
+          <a:p>
+            <a:r>
+              <a:rPr lang="en-US" dirty="0" smtClean="0">
+                <a:latin typeface="Consolas" panose="020B0609020204030204" pitchFamily="49" charset="0"/>
+              </a:rPr>
+              <a:t>code</a:t>
+            </a:r>
+            <a:endParaRPr lang="en-US" dirty="0">
+              <a:latin typeface="Consolas" panose="020B0609020204030204" pitchFamily="49" charset="0"/>
+            </a:endParaRPr>
+          </a:p>
+        </p:txBody>
+      </p:sp>
+      <p:sp>
+        <p:nvSpPr>
+          <p:cNvPr id="22" name="Rectangle 21"/>
+          <p:cNvSpPr/>
+          <p:nvPr/>
+        </p:nvSpPr>
+        <p:spPr>
+          <a:xfrm>
+            <a:off x="2483768" y="4275054"/>
+            <a:ext cx="1728192" cy="216024"/>
+          </a:xfrm>
+          <a:prstGeom prst="rect">
+            <a:avLst/>
+          </a:prstGeom>
+          <a:solidFill>
+            <a:schemeClr val="bg1">
+              <a:lumMod val="75000"/>
+            </a:schemeClr>
+          </a:solidFill>
+          <a:ln>
+            <a:solidFill>
+              <a:schemeClr val="bg1">
+                <a:lumMod val="75000"/>
+              </a:schemeClr>
+            </a:solidFill>
+          </a:ln>
+        </p:spPr>
+        <p:style>
+          <a:lnRef idx="2">
+            <a:schemeClr val="accent1">
+              <a:shade val="50000"/>
+            </a:schemeClr>
+          </a:lnRef>
+          <a:fillRef idx="1">
+            <a:schemeClr val="accent1"/>
+          </a:fillRef>
+          <a:effectRef idx="0">
+            <a:schemeClr val="accent1"/>
+          </a:effectRef>
+          <a:fontRef idx="minor">
+            <a:schemeClr val="lt1"/>
+          </a:fontRef>
+        </p:style>
+        <p:txBody>
+          <a:bodyPr rtlCol="0" anchor="ctr"/>
+          <a:lstStyle/>
+          <a:p>
+            <a:r>
+              <a:rPr lang="en-US" dirty="0" smtClean="0">
+                <a:latin typeface="Consolas" panose="020B0609020204030204" pitchFamily="49" charset="0"/>
+              </a:rPr>
+              <a:t>code</a:t>
+            </a:r>
+            <a:endParaRPr lang="en-US" dirty="0">
+              <a:latin typeface="Consolas" panose="020B0609020204030204" pitchFamily="49" charset="0"/>
+            </a:endParaRPr>
+          </a:p>
+        </p:txBody>
+      </p:sp>
+      <p:sp>
+        <p:nvSpPr>
+          <p:cNvPr id="23" name="Rectangle 22"/>
+          <p:cNvSpPr/>
+          <p:nvPr/>
+        </p:nvSpPr>
+        <p:spPr>
+          <a:xfrm>
+            <a:off x="2051720" y="4550620"/>
+            <a:ext cx="1080120" cy="216024"/>
+          </a:xfrm>
+          <a:prstGeom prst="rect">
+            <a:avLst/>
+          </a:prstGeom>
+          <a:solidFill>
+            <a:schemeClr val="bg1">
+              <a:lumMod val="75000"/>
+            </a:schemeClr>
+          </a:solidFill>
+          <a:ln>
+            <a:solidFill>
+              <a:schemeClr val="bg1">
+                <a:lumMod val="75000"/>
+              </a:schemeClr>
+            </a:solidFill>
+          </a:ln>
+        </p:spPr>
+        <p:style>
+          <a:lnRef idx="2">
+            <a:schemeClr val="accent1">
+              <a:shade val="50000"/>
+            </a:schemeClr>
+          </a:lnRef>
+          <a:fillRef idx="1">
+            <a:schemeClr val="accent1"/>
+          </a:fillRef>
+          <a:effectRef idx="0">
+            <a:schemeClr val="accent1"/>
+          </a:effectRef>
+          <a:fontRef idx="minor">
+            <a:schemeClr val="lt1"/>
+          </a:fontRef>
+        </p:style>
+        <p:txBody>
+          <a:bodyPr rtlCol="0" anchor="ctr"/>
+          <a:lstStyle/>
+          <a:p>
+            <a:r>
+              <a:rPr lang="en-US" dirty="0" smtClean="0">
+                <a:latin typeface="Consolas" panose="020B0609020204030204" pitchFamily="49" charset="0"/>
+              </a:rPr>
+              <a:t>code</a:t>
+            </a:r>
+            <a:endParaRPr lang="en-US" dirty="0">
+              <a:latin typeface="Consolas" panose="020B0609020204030204" pitchFamily="49" charset="0"/>
+            </a:endParaRPr>
+          </a:p>
+        </p:txBody>
+      </p:sp>
+      <p:sp>
+        <p:nvSpPr>
+          <p:cNvPr id="24" name="Rectangle 23"/>
+          <p:cNvSpPr/>
+          <p:nvPr/>
+        </p:nvSpPr>
+        <p:spPr>
+          <a:xfrm>
+            <a:off x="1619672" y="4826186"/>
+            <a:ext cx="1080120" cy="216024"/>
+          </a:xfrm>
+          <a:prstGeom prst="rect">
+            <a:avLst/>
+          </a:prstGeom>
+          <a:solidFill>
+            <a:schemeClr val="bg1">
+              <a:lumMod val="75000"/>
+            </a:schemeClr>
+          </a:solidFill>
+          <a:ln>
+            <a:solidFill>
+              <a:schemeClr val="bg1">
+                <a:lumMod val="75000"/>
+              </a:schemeClr>
+            </a:solidFill>
+          </a:ln>
+        </p:spPr>
+        <p:style>
+          <a:lnRef idx="2">
+            <a:schemeClr val="accent1">
+              <a:shade val="50000"/>
+            </a:schemeClr>
+          </a:lnRef>
+          <a:fillRef idx="1">
+            <a:schemeClr val="accent1"/>
+          </a:fillRef>
+          <a:effectRef idx="0">
+            <a:schemeClr val="accent1"/>
+          </a:effectRef>
+          <a:fontRef idx="minor">
+            <a:schemeClr val="lt1"/>
+          </a:fontRef>
+        </p:style>
+        <p:txBody>
+          <a:bodyPr rtlCol="0" anchor="ctr"/>
+          <a:lstStyle/>
+          <a:p>
+            <a:r>
+              <a:rPr lang="en-US" dirty="0" smtClean="0">
+                <a:latin typeface="Consolas" panose="020B0609020204030204" pitchFamily="49" charset="0"/>
+              </a:rPr>
+              <a:t>code</a:t>
+            </a:r>
+            <a:endParaRPr lang="en-US" dirty="0">
+              <a:latin typeface="Consolas" panose="020B0609020204030204" pitchFamily="49" charset="0"/>
+            </a:endParaRPr>
+          </a:p>
+        </p:txBody>
+      </p:sp>
+      <p:sp>
+        <p:nvSpPr>
+          <p:cNvPr id="25" name="Rectangle 24"/>
+          <p:cNvSpPr/>
+          <p:nvPr/>
+        </p:nvSpPr>
+        <p:spPr>
+          <a:xfrm>
+            <a:off x="2051720" y="5101752"/>
+            <a:ext cx="1584176" cy="216024"/>
+          </a:xfrm>
+          <a:prstGeom prst="rect">
+            <a:avLst/>
+          </a:prstGeom>
+          <a:solidFill>
+            <a:schemeClr val="bg1">
+              <a:lumMod val="75000"/>
+            </a:schemeClr>
+          </a:solidFill>
+          <a:ln>
+            <a:solidFill>
+              <a:schemeClr val="bg1">
+                <a:lumMod val="75000"/>
+              </a:schemeClr>
+            </a:solidFill>
+          </a:ln>
+        </p:spPr>
+        <p:style>
+          <a:lnRef idx="2">
+            <a:schemeClr val="accent1">
+              <a:shade val="50000"/>
+            </a:schemeClr>
+          </a:lnRef>
+          <a:fillRef idx="1">
+            <a:schemeClr val="accent1"/>
+          </a:fillRef>
+          <a:effectRef idx="0">
+            <a:schemeClr val="accent1"/>
+          </a:effectRef>
+          <a:fontRef idx="minor">
+            <a:schemeClr val="lt1"/>
+          </a:fontRef>
+        </p:style>
+        <p:txBody>
+          <a:bodyPr rtlCol="0" anchor="ctr"/>
+          <a:lstStyle/>
+          <a:p>
+            <a:r>
+              <a:rPr lang="en-US" dirty="0" smtClean="0">
+                <a:latin typeface="Consolas" panose="020B0609020204030204" pitchFamily="49" charset="0"/>
+              </a:rPr>
+              <a:t>code</a:t>
+            </a:r>
+            <a:endParaRPr lang="en-US" dirty="0">
+              <a:latin typeface="Consolas" panose="020B0609020204030204" pitchFamily="49" charset="0"/>
+            </a:endParaRPr>
+          </a:p>
+        </p:txBody>
+      </p:sp>
+      <p:sp>
+        <p:nvSpPr>
+          <p:cNvPr id="26" name="Rectangle 25"/>
+          <p:cNvSpPr/>
+          <p:nvPr/>
+        </p:nvSpPr>
+        <p:spPr>
+          <a:xfrm>
+            <a:off x="1619672" y="5377318"/>
+            <a:ext cx="1080120" cy="216024"/>
+          </a:xfrm>
+          <a:prstGeom prst="rect">
+            <a:avLst/>
+          </a:prstGeom>
+          <a:solidFill>
+            <a:schemeClr val="bg1">
+              <a:lumMod val="75000"/>
+            </a:schemeClr>
+          </a:solidFill>
+          <a:ln>
+            <a:solidFill>
+              <a:schemeClr val="bg1">
+                <a:lumMod val="75000"/>
+              </a:schemeClr>
+            </a:solidFill>
+          </a:ln>
+        </p:spPr>
+        <p:style>
+          <a:lnRef idx="2">
+            <a:schemeClr val="accent1">
+              <a:shade val="50000"/>
+            </a:schemeClr>
+          </a:lnRef>
+          <a:fillRef idx="1">
+            <a:schemeClr val="accent1"/>
+          </a:fillRef>
+          <a:effectRef idx="0">
+            <a:schemeClr val="accent1"/>
+          </a:effectRef>
+          <a:fontRef idx="minor">
+            <a:schemeClr val="lt1"/>
+          </a:fontRef>
+        </p:style>
+        <p:txBody>
+          <a:bodyPr rtlCol="0" anchor="ctr"/>
+          <a:lstStyle/>
+          <a:p>
+            <a:r>
+              <a:rPr lang="en-US" dirty="0" smtClean="0">
+                <a:latin typeface="Consolas" panose="020B0609020204030204" pitchFamily="49" charset="0"/>
+              </a:rPr>
+              <a:t>code</a:t>
+            </a:r>
+            <a:endParaRPr lang="en-US" dirty="0">
+              <a:latin typeface="Consolas" panose="020B0609020204030204" pitchFamily="49" charset="0"/>
+            </a:endParaRPr>
+          </a:p>
+        </p:txBody>
+      </p:sp>
+      <p:sp>
+        <p:nvSpPr>
+          <p:cNvPr id="27" name="Rectangle 26"/>
+          <p:cNvSpPr/>
+          <p:nvPr/>
+        </p:nvSpPr>
+        <p:spPr>
+          <a:xfrm>
+            <a:off x="5960368" y="860250"/>
+            <a:ext cx="1080120" cy="216024"/>
+          </a:xfrm>
+          <a:prstGeom prst="rect">
+            <a:avLst/>
+          </a:prstGeom>
+          <a:solidFill>
+            <a:schemeClr val="bg1">
+              <a:lumMod val="75000"/>
+            </a:schemeClr>
+          </a:solidFill>
+          <a:ln>
+            <a:solidFill>
+              <a:schemeClr val="bg1">
+                <a:lumMod val="75000"/>
+              </a:schemeClr>
+            </a:solidFill>
+          </a:ln>
+        </p:spPr>
+        <p:style>
+          <a:lnRef idx="2">
+            <a:schemeClr val="accent1">
+              <a:shade val="50000"/>
+            </a:schemeClr>
+          </a:lnRef>
+          <a:fillRef idx="1">
+            <a:schemeClr val="accent1"/>
+          </a:fillRef>
+          <a:effectRef idx="0">
+            <a:schemeClr val="accent1"/>
+          </a:effectRef>
+          <a:fontRef idx="minor">
+            <a:schemeClr val="lt1"/>
+          </a:fontRef>
+        </p:style>
+        <p:txBody>
+          <a:bodyPr rtlCol="0" anchor="ctr"/>
+          <a:lstStyle/>
+          <a:p>
+            <a:r>
+              <a:rPr lang="en-US" dirty="0" smtClean="0">
+                <a:latin typeface="Consolas" panose="020B0609020204030204" pitchFamily="49" charset="0"/>
+              </a:rPr>
+              <a:t>code</a:t>
+            </a:r>
+            <a:endParaRPr lang="en-US" dirty="0">
+              <a:latin typeface="Consolas" panose="020B0609020204030204" pitchFamily="49" charset="0"/>
+            </a:endParaRPr>
+          </a:p>
+        </p:txBody>
+      </p:sp>
+      <p:sp>
+        <p:nvSpPr>
+          <p:cNvPr id="28" name="Rectangle 27"/>
+          <p:cNvSpPr/>
+          <p:nvPr/>
+        </p:nvSpPr>
+        <p:spPr>
+          <a:xfrm>
+            <a:off x="6392416" y="1135816"/>
+            <a:ext cx="1563960" cy="216024"/>
+          </a:xfrm>
+          <a:prstGeom prst="rect">
+            <a:avLst/>
+          </a:prstGeom>
+          <a:solidFill>
+            <a:schemeClr val="bg1">
+              <a:lumMod val="75000"/>
+            </a:schemeClr>
+          </a:solidFill>
+          <a:ln>
+            <a:solidFill>
+              <a:schemeClr val="bg1">
+                <a:lumMod val="75000"/>
+              </a:schemeClr>
+            </a:solidFill>
+          </a:ln>
+        </p:spPr>
+        <p:style>
+          <a:lnRef idx="2">
+            <a:schemeClr val="accent1">
+              <a:shade val="50000"/>
+            </a:schemeClr>
+          </a:lnRef>
+          <a:fillRef idx="1">
+            <a:schemeClr val="accent1"/>
+          </a:fillRef>
+          <a:effectRef idx="0">
+            <a:schemeClr val="accent1"/>
+          </a:effectRef>
+          <a:fontRef idx="minor">
+            <a:schemeClr val="lt1"/>
+          </a:fontRef>
+        </p:style>
+        <p:txBody>
+          <a:bodyPr rtlCol="0" anchor="ctr"/>
+          <a:lstStyle/>
+          <a:p>
+            <a:r>
+              <a:rPr lang="en-US" dirty="0" smtClean="0">
+                <a:latin typeface="Consolas" panose="020B0609020204030204" pitchFamily="49" charset="0"/>
+              </a:rPr>
+              <a:t>code</a:t>
+            </a:r>
+            <a:endParaRPr lang="en-US" dirty="0">
+              <a:latin typeface="Consolas" panose="020B0609020204030204" pitchFamily="49" charset="0"/>
+            </a:endParaRPr>
+          </a:p>
+        </p:txBody>
+      </p:sp>
+      <p:sp>
+        <p:nvSpPr>
+          <p:cNvPr id="29" name="Rectangle 28"/>
+          <p:cNvSpPr/>
+          <p:nvPr/>
+        </p:nvSpPr>
+        <p:spPr>
+          <a:xfrm>
+            <a:off x="5964866" y="1412776"/>
+            <a:ext cx="1485222" cy="216024"/>
+          </a:xfrm>
+          <a:prstGeom prst="rect">
+            <a:avLst/>
+          </a:prstGeom>
+          <a:solidFill>
+            <a:schemeClr val="bg1">
+              <a:lumMod val="75000"/>
+            </a:schemeClr>
+          </a:solidFill>
+          <a:ln>
+            <a:solidFill>
+              <a:schemeClr val="bg1">
+                <a:lumMod val="75000"/>
+              </a:schemeClr>
+            </a:solidFill>
+          </a:ln>
+        </p:spPr>
+        <p:style>
+          <a:lnRef idx="2">
+            <a:schemeClr val="accent1">
+              <a:shade val="50000"/>
+            </a:schemeClr>
+          </a:lnRef>
+          <a:fillRef idx="1">
+            <a:schemeClr val="accent1"/>
+          </a:fillRef>
+          <a:effectRef idx="0">
+            <a:schemeClr val="accent1"/>
+          </a:effectRef>
+          <a:fontRef idx="minor">
+            <a:schemeClr val="lt1"/>
+          </a:fontRef>
+        </p:style>
+        <p:txBody>
+          <a:bodyPr rtlCol="0" anchor="ctr"/>
+          <a:lstStyle/>
+          <a:p>
+            <a:r>
+              <a:rPr lang="en-US" dirty="0" smtClean="0">
+                <a:latin typeface="Consolas" panose="020B0609020204030204" pitchFamily="49" charset="0"/>
+              </a:rPr>
+              <a:t>code</a:t>
+            </a:r>
+            <a:endParaRPr lang="en-US" dirty="0">
+              <a:latin typeface="Consolas" panose="020B0609020204030204" pitchFamily="49" charset="0"/>
+            </a:endParaRPr>
+          </a:p>
+        </p:txBody>
+      </p:sp>
+      <p:sp>
+        <p:nvSpPr>
+          <p:cNvPr id="30" name="Rectangle 29"/>
+          <p:cNvSpPr/>
+          <p:nvPr/>
+        </p:nvSpPr>
+        <p:spPr>
+          <a:xfrm>
+            <a:off x="6396914" y="1688342"/>
+            <a:ext cx="1756486" cy="216024"/>
+          </a:xfrm>
+          <a:prstGeom prst="rect">
+            <a:avLst/>
+          </a:prstGeom>
+          <a:solidFill>
+            <a:schemeClr val="bg1">
+              <a:lumMod val="75000"/>
+            </a:schemeClr>
+          </a:solidFill>
+          <a:ln>
+            <a:solidFill>
+              <a:schemeClr val="bg1">
+                <a:lumMod val="75000"/>
+              </a:schemeClr>
+            </a:solidFill>
+          </a:ln>
+        </p:spPr>
+        <p:style>
+          <a:lnRef idx="2">
+            <a:schemeClr val="accent1">
+              <a:shade val="50000"/>
+            </a:schemeClr>
+          </a:lnRef>
+          <a:fillRef idx="1">
+            <a:schemeClr val="accent1"/>
+          </a:fillRef>
+          <a:effectRef idx="0">
+            <a:schemeClr val="accent1"/>
+          </a:effectRef>
+          <a:fontRef idx="minor">
+            <a:schemeClr val="lt1"/>
+          </a:fontRef>
+        </p:style>
+        <p:txBody>
+          <a:bodyPr rtlCol="0" anchor="ctr"/>
+          <a:lstStyle/>
+          <a:p>
+            <a:r>
+              <a:rPr lang="en-US" dirty="0" smtClean="0">
+                <a:latin typeface="Consolas" panose="020B0609020204030204" pitchFamily="49" charset="0"/>
+              </a:rPr>
+              <a:t>code</a:t>
+            </a:r>
+            <a:endParaRPr lang="en-US" dirty="0">
+              <a:latin typeface="Consolas" panose="020B0609020204030204" pitchFamily="49" charset="0"/>
+            </a:endParaRPr>
+          </a:p>
+        </p:txBody>
+      </p:sp>
+      <p:sp>
+        <p:nvSpPr>
+          <p:cNvPr id="31" name="Rectangle 30"/>
+          <p:cNvSpPr/>
+          <p:nvPr/>
+        </p:nvSpPr>
+        <p:spPr>
+          <a:xfrm>
+            <a:off x="5973862" y="1956731"/>
+            <a:ext cx="1476226" cy="216024"/>
+          </a:xfrm>
+          <a:prstGeom prst="rect">
+            <a:avLst/>
+          </a:prstGeom>
+          <a:solidFill>
+            <a:schemeClr val="bg1">
+              <a:lumMod val="75000"/>
+            </a:schemeClr>
+          </a:solidFill>
+          <a:ln>
+            <a:solidFill>
+              <a:schemeClr val="bg1">
+                <a:lumMod val="75000"/>
+              </a:schemeClr>
+            </a:solidFill>
+          </a:ln>
+        </p:spPr>
+        <p:style>
+          <a:lnRef idx="2">
+            <a:schemeClr val="accent1">
+              <a:shade val="50000"/>
+            </a:schemeClr>
+          </a:lnRef>
+          <a:fillRef idx="1">
+            <a:schemeClr val="accent1"/>
+          </a:fillRef>
+          <a:effectRef idx="0">
+            <a:schemeClr val="accent1"/>
+          </a:effectRef>
+          <a:fontRef idx="minor">
+            <a:schemeClr val="lt1"/>
+          </a:fontRef>
+        </p:style>
+        <p:txBody>
+          <a:bodyPr rtlCol="0" anchor="ctr"/>
+          <a:lstStyle/>
+          <a:p>
+            <a:r>
+              <a:rPr lang="en-US" dirty="0" smtClean="0">
+                <a:latin typeface="Consolas" panose="020B0609020204030204" pitchFamily="49" charset="0"/>
+              </a:rPr>
+              <a:t>code</a:t>
+            </a:r>
+            <a:endParaRPr lang="en-US" dirty="0">
+              <a:latin typeface="Consolas" panose="020B0609020204030204" pitchFamily="49" charset="0"/>
+            </a:endParaRPr>
+          </a:p>
+        </p:txBody>
+      </p:sp>
+      <p:sp>
+        <p:nvSpPr>
+          <p:cNvPr id="32" name="Rectangle 31"/>
+          <p:cNvSpPr/>
+          <p:nvPr/>
+        </p:nvSpPr>
+        <p:spPr>
+          <a:xfrm>
+            <a:off x="6402524" y="2225120"/>
+            <a:ext cx="1563960" cy="216024"/>
+          </a:xfrm>
+          <a:prstGeom prst="rect">
+            <a:avLst/>
+          </a:prstGeom>
+          <a:solidFill>
+            <a:schemeClr val="bg1">
+              <a:lumMod val="75000"/>
+            </a:schemeClr>
+          </a:solidFill>
+          <a:ln>
+            <a:solidFill>
+              <a:schemeClr val="bg1">
+                <a:lumMod val="75000"/>
+              </a:schemeClr>
+            </a:solidFill>
+          </a:ln>
+        </p:spPr>
+        <p:style>
+          <a:lnRef idx="2">
+            <a:schemeClr val="accent1">
+              <a:shade val="50000"/>
+            </a:schemeClr>
+          </a:lnRef>
+          <a:fillRef idx="1">
+            <a:schemeClr val="accent1"/>
+          </a:fillRef>
+          <a:effectRef idx="0">
+            <a:schemeClr val="accent1"/>
+          </a:effectRef>
+          <a:fontRef idx="minor">
+            <a:schemeClr val="lt1"/>
+          </a:fontRef>
+        </p:style>
+        <p:txBody>
+          <a:bodyPr rtlCol="0" anchor="ctr"/>
+          <a:lstStyle/>
+          <a:p>
+            <a:r>
+              <a:rPr lang="en-US" dirty="0" smtClean="0">
+                <a:latin typeface="Consolas" panose="020B0609020204030204" pitchFamily="49" charset="0"/>
+              </a:rPr>
+              <a:t>code</a:t>
+            </a:r>
+            <a:endParaRPr lang="en-US" dirty="0">
+              <a:latin typeface="Consolas" panose="020B0609020204030204" pitchFamily="49" charset="0"/>
+            </a:endParaRPr>
+          </a:p>
+        </p:txBody>
+      </p:sp>
+      <p:sp>
+        <p:nvSpPr>
+          <p:cNvPr id="33" name="Rectangle 32"/>
+          <p:cNvSpPr/>
+          <p:nvPr/>
+        </p:nvSpPr>
+        <p:spPr>
+          <a:xfrm>
+            <a:off x="5973862" y="2493509"/>
+            <a:ext cx="1483444" cy="216024"/>
+          </a:xfrm>
+          <a:prstGeom prst="rect">
+            <a:avLst/>
+          </a:prstGeom>
+          <a:solidFill>
+            <a:schemeClr val="bg1">
+              <a:lumMod val="75000"/>
+            </a:schemeClr>
+          </a:solidFill>
+          <a:ln>
+            <a:solidFill>
+              <a:schemeClr val="bg1">
+                <a:lumMod val="75000"/>
+              </a:schemeClr>
+            </a:solidFill>
+          </a:ln>
+        </p:spPr>
+        <p:style>
+          <a:lnRef idx="2">
+            <a:schemeClr val="accent1">
+              <a:shade val="50000"/>
+            </a:schemeClr>
+          </a:lnRef>
+          <a:fillRef idx="1">
+            <a:schemeClr val="accent1"/>
+          </a:fillRef>
+          <a:effectRef idx="0">
+            <a:schemeClr val="accent1"/>
+          </a:effectRef>
+          <a:fontRef idx="minor">
+            <a:schemeClr val="lt1"/>
+          </a:fontRef>
+        </p:style>
+        <p:txBody>
+          <a:bodyPr rtlCol="0" anchor="ctr"/>
+          <a:lstStyle/>
+          <a:p>
+            <a:r>
+              <a:rPr lang="en-US" dirty="0" smtClean="0">
+                <a:latin typeface="Consolas" panose="020B0609020204030204" pitchFamily="49" charset="0"/>
+              </a:rPr>
+              <a:t>code</a:t>
+            </a:r>
+            <a:endParaRPr lang="en-US" dirty="0">
+              <a:latin typeface="Consolas" panose="020B0609020204030204" pitchFamily="49" charset="0"/>
+            </a:endParaRPr>
+          </a:p>
+        </p:txBody>
+      </p:sp>
+      <p:sp>
+        <p:nvSpPr>
+          <p:cNvPr id="34" name="Rectangle 33"/>
+          <p:cNvSpPr/>
+          <p:nvPr/>
+        </p:nvSpPr>
+        <p:spPr>
+          <a:xfrm>
+            <a:off x="6390184" y="2769075"/>
+            <a:ext cx="1730424" cy="216024"/>
+          </a:xfrm>
+          <a:prstGeom prst="rect">
+            <a:avLst/>
+          </a:prstGeom>
+          <a:solidFill>
+            <a:schemeClr val="bg1">
+              <a:lumMod val="75000"/>
+            </a:schemeClr>
+          </a:solidFill>
+          <a:ln>
+            <a:solidFill>
+              <a:schemeClr val="bg1">
+                <a:lumMod val="75000"/>
+              </a:schemeClr>
+            </a:solidFill>
+          </a:ln>
+        </p:spPr>
+        <p:style>
+          <a:lnRef idx="2">
+            <a:schemeClr val="accent1">
+              <a:shade val="50000"/>
+            </a:schemeClr>
+          </a:lnRef>
+          <a:fillRef idx="1">
+            <a:schemeClr val="accent1"/>
+          </a:fillRef>
+          <a:effectRef idx="0">
+            <a:schemeClr val="accent1"/>
+          </a:effectRef>
+          <a:fontRef idx="minor">
+            <a:schemeClr val="lt1"/>
+          </a:fontRef>
+        </p:style>
+        <p:txBody>
+          <a:bodyPr rtlCol="0" anchor="ctr"/>
+          <a:lstStyle/>
+          <a:p>
+            <a:r>
+              <a:rPr lang="en-US" dirty="0" smtClean="0">
+                <a:latin typeface="Consolas" panose="020B0609020204030204" pitchFamily="49" charset="0"/>
+              </a:rPr>
+              <a:t>code</a:t>
+            </a:r>
+            <a:endParaRPr lang="en-US" dirty="0">
+              <a:latin typeface="Consolas" panose="020B0609020204030204" pitchFamily="49" charset="0"/>
+            </a:endParaRPr>
+          </a:p>
+        </p:txBody>
+      </p:sp>
+      <p:sp>
+        <p:nvSpPr>
+          <p:cNvPr id="35" name="Rectangle 34"/>
+          <p:cNvSpPr/>
+          <p:nvPr/>
+        </p:nvSpPr>
+        <p:spPr>
+          <a:xfrm>
+            <a:off x="5977651" y="3037464"/>
+            <a:ext cx="1080120" cy="216024"/>
+          </a:xfrm>
+          <a:prstGeom prst="rect">
+            <a:avLst/>
+          </a:prstGeom>
+          <a:solidFill>
+            <a:schemeClr val="bg1">
+              <a:lumMod val="75000"/>
+            </a:schemeClr>
+          </a:solidFill>
+          <a:ln>
+            <a:solidFill>
+              <a:schemeClr val="bg1">
+                <a:lumMod val="75000"/>
+              </a:schemeClr>
+            </a:solidFill>
+          </a:ln>
+        </p:spPr>
+        <p:style>
+          <a:lnRef idx="2">
+            <a:schemeClr val="accent1">
+              <a:shade val="50000"/>
+            </a:schemeClr>
+          </a:lnRef>
+          <a:fillRef idx="1">
+            <a:schemeClr val="accent1"/>
+          </a:fillRef>
+          <a:effectRef idx="0">
+            <a:schemeClr val="accent1"/>
+          </a:effectRef>
+          <a:fontRef idx="minor">
+            <a:schemeClr val="lt1"/>
+          </a:fontRef>
+        </p:style>
+        <p:txBody>
+          <a:bodyPr rtlCol="0" anchor="ctr"/>
+          <a:lstStyle/>
+          <a:p>
+            <a:r>
+              <a:rPr lang="en-US" dirty="0" smtClean="0">
+                <a:latin typeface="Consolas" panose="020B0609020204030204" pitchFamily="49" charset="0"/>
+              </a:rPr>
+              <a:t>code</a:t>
+            </a:r>
+            <a:endParaRPr lang="en-US" dirty="0">
+              <a:latin typeface="Consolas" panose="020B0609020204030204" pitchFamily="49" charset="0"/>
+            </a:endParaRPr>
+          </a:p>
+        </p:txBody>
+      </p:sp>
+      <p:sp>
+        <p:nvSpPr>
+          <p:cNvPr id="36" name="Rectangle 35"/>
+          <p:cNvSpPr/>
+          <p:nvPr/>
+        </p:nvSpPr>
+        <p:spPr>
+          <a:xfrm>
+            <a:off x="6390184" y="3315782"/>
+            <a:ext cx="1036240" cy="216024"/>
+          </a:xfrm>
+          <a:prstGeom prst="rect">
+            <a:avLst/>
+          </a:prstGeom>
+          <a:solidFill>
+            <a:schemeClr val="bg1">
+              <a:lumMod val="75000"/>
+            </a:schemeClr>
+          </a:solidFill>
+          <a:ln>
+            <a:solidFill>
+              <a:schemeClr val="bg1">
+                <a:lumMod val="75000"/>
+              </a:schemeClr>
+            </a:solidFill>
+          </a:ln>
+        </p:spPr>
+        <p:style>
+          <a:lnRef idx="2">
+            <a:schemeClr val="accent1">
+              <a:shade val="50000"/>
+            </a:schemeClr>
+          </a:lnRef>
+          <a:fillRef idx="1">
+            <a:schemeClr val="accent1"/>
+          </a:fillRef>
+          <a:effectRef idx="0">
+            <a:schemeClr val="accent1"/>
+          </a:effectRef>
+          <a:fontRef idx="minor">
+            <a:schemeClr val="lt1"/>
+          </a:fontRef>
+        </p:style>
+        <p:txBody>
+          <a:bodyPr rtlCol="0" anchor="ctr"/>
+          <a:lstStyle/>
+          <a:p>
+            <a:r>
+              <a:rPr lang="en-US" dirty="0" smtClean="0">
+                <a:latin typeface="Consolas" panose="020B0609020204030204" pitchFamily="49" charset="0"/>
+              </a:rPr>
+              <a:t>code</a:t>
+            </a:r>
+            <a:endParaRPr lang="en-US" dirty="0">
+              <a:latin typeface="Consolas" panose="020B0609020204030204" pitchFamily="49" charset="0"/>
+            </a:endParaRPr>
+          </a:p>
+        </p:txBody>
+      </p:sp>
+      <p:sp>
+        <p:nvSpPr>
+          <p:cNvPr id="37" name="Rectangle 36"/>
+          <p:cNvSpPr/>
+          <p:nvPr/>
+        </p:nvSpPr>
+        <p:spPr>
+          <a:xfrm>
+            <a:off x="6396914" y="3573344"/>
+            <a:ext cx="1291646" cy="216024"/>
+          </a:xfrm>
+          <a:prstGeom prst="rect">
+            <a:avLst/>
+          </a:prstGeom>
+          <a:solidFill>
+            <a:schemeClr val="bg1">
+              <a:lumMod val="75000"/>
+            </a:schemeClr>
+          </a:solidFill>
+          <a:ln>
+            <a:solidFill>
+              <a:schemeClr val="bg1">
+                <a:lumMod val="75000"/>
+              </a:schemeClr>
+            </a:solidFill>
+          </a:ln>
+        </p:spPr>
+        <p:style>
+          <a:lnRef idx="2">
+            <a:schemeClr val="accent1">
+              <a:shade val="50000"/>
+            </a:schemeClr>
+          </a:lnRef>
+          <a:fillRef idx="1">
+            <a:schemeClr val="accent1"/>
+          </a:fillRef>
+          <a:effectRef idx="0">
+            <a:schemeClr val="accent1"/>
+          </a:effectRef>
+          <a:fontRef idx="minor">
+            <a:schemeClr val="lt1"/>
+          </a:fontRef>
+        </p:style>
+        <p:txBody>
+          <a:bodyPr rtlCol="0" anchor="ctr"/>
+          <a:lstStyle/>
+          <a:p>
+            <a:r>
+              <a:rPr lang="en-US" dirty="0" smtClean="0">
+                <a:latin typeface="Consolas" panose="020B0609020204030204" pitchFamily="49" charset="0"/>
+              </a:rPr>
+              <a:t>code</a:t>
+            </a:r>
+            <a:endParaRPr lang="en-US" dirty="0">
+              <a:latin typeface="Consolas" panose="020B0609020204030204" pitchFamily="49" charset="0"/>
+            </a:endParaRPr>
+          </a:p>
+        </p:txBody>
+      </p:sp>
+      <p:sp>
+        <p:nvSpPr>
+          <p:cNvPr id="38" name="Rectangle 37"/>
+          <p:cNvSpPr/>
+          <p:nvPr/>
+        </p:nvSpPr>
+        <p:spPr>
+          <a:xfrm>
+            <a:off x="5954485" y="3857494"/>
+            <a:ext cx="1563960" cy="216024"/>
+          </a:xfrm>
+          <a:prstGeom prst="rect">
+            <a:avLst/>
+          </a:prstGeom>
+          <a:solidFill>
+            <a:schemeClr val="bg1">
+              <a:lumMod val="75000"/>
+            </a:schemeClr>
+          </a:solidFill>
+          <a:ln>
+            <a:solidFill>
+              <a:schemeClr val="bg1">
+                <a:lumMod val="75000"/>
+              </a:schemeClr>
+            </a:solidFill>
+          </a:ln>
+        </p:spPr>
+        <p:style>
+          <a:lnRef idx="2">
+            <a:schemeClr val="accent1">
+              <a:shade val="50000"/>
+            </a:schemeClr>
+          </a:lnRef>
+          <a:fillRef idx="1">
+            <a:schemeClr val="accent1"/>
+          </a:fillRef>
+          <a:effectRef idx="0">
+            <a:schemeClr val="accent1"/>
+          </a:effectRef>
+          <a:fontRef idx="minor">
+            <a:schemeClr val="lt1"/>
+          </a:fontRef>
+        </p:style>
+        <p:txBody>
+          <a:bodyPr rtlCol="0" anchor="ctr"/>
+          <a:lstStyle/>
+          <a:p>
+            <a:r>
+              <a:rPr lang="en-US" dirty="0" smtClean="0">
+                <a:latin typeface="Consolas" panose="020B0609020204030204" pitchFamily="49" charset="0"/>
+              </a:rPr>
+              <a:t>code</a:t>
+            </a:r>
+            <a:endParaRPr lang="en-US" dirty="0">
+              <a:latin typeface="Consolas" panose="020B0609020204030204" pitchFamily="49" charset="0"/>
             </a:endParaRPr>
           </a:p>
         </p:txBody>

</xml_diff>